<commit_message>
make the individual report,added programs, circuits.
</commit_message>
<xml_diff>
--- a/img/overview_lgt_rcv_snd_tx.pptx
+++ b/img/overview_lgt_rcv_snd_tx.pptx
@@ -6,6 +6,7 @@
   </p:sldMasterIdLst>
   <p:sldIdLst>
     <p:sldId id="256" r:id="rId2"/>
+    <p:sldId id="258" r:id="rId3"/>
   </p:sldIdLst>
   <p:sldSz cx="12192000" cy="6858000"/>
   <p:notesSz cx="6858000" cy="9144000"/>
@@ -104,6 +105,11 @@
       </a:defRPr>
     </a:lvl9pPr>
   </p:defaultTextStyle>
+  <p:extLst>
+    <p:ext uri="{EFAFB233-063F-42B5-8137-9DF3F51BA10A}">
+      <p15:sldGuideLst xmlns:p15="http://schemas.microsoft.com/office/powerpoint/2012/main"/>
+    </p:ext>
+  </p:extLst>
 </p:presentation>
 </file>
 
@@ -419,7 +425,7 @@
           <a:p>
             <a:fld id="{87D3D784-D427-2D4E-91ED-57ED6EC2F9E2}" type="datetimeFigureOut">
               <a:rPr kumimoji="1" lang="ja-JP" altLang="en-US" smtClean="0"/>
-              <a:t>2025/5/16</a:t>
+              <a:t>2025/5/21</a:t>
             </a:fld>
             <a:endParaRPr kumimoji="1" lang="ja-JP" altLang="en-US"/>
           </a:p>
@@ -649,7 +655,7 @@
           <a:p>
             <a:fld id="{87D3D784-D427-2D4E-91ED-57ED6EC2F9E2}" type="datetimeFigureOut">
               <a:rPr kumimoji="1" lang="ja-JP" altLang="en-US" smtClean="0"/>
-              <a:t>2025/5/16</a:t>
+              <a:t>2025/5/21</a:t>
             </a:fld>
             <a:endParaRPr kumimoji="1" lang="ja-JP" altLang="en-US"/>
           </a:p>
@@ -889,7 +895,7 @@
           <a:p>
             <a:fld id="{87D3D784-D427-2D4E-91ED-57ED6EC2F9E2}" type="datetimeFigureOut">
               <a:rPr kumimoji="1" lang="ja-JP" altLang="en-US" smtClean="0"/>
-              <a:t>2025/5/16</a:t>
+              <a:t>2025/5/21</a:t>
             </a:fld>
             <a:endParaRPr kumimoji="1" lang="ja-JP" altLang="en-US"/>
           </a:p>
@@ -1119,7 +1125,7 @@
           <a:p>
             <a:fld id="{87D3D784-D427-2D4E-91ED-57ED6EC2F9E2}" type="datetimeFigureOut">
               <a:rPr kumimoji="1" lang="ja-JP" altLang="en-US" smtClean="0"/>
-              <a:t>2025/5/16</a:t>
+              <a:t>2025/5/21</a:t>
             </a:fld>
             <a:endParaRPr kumimoji="1" lang="ja-JP" altLang="en-US"/>
           </a:p>
@@ -1394,7 +1400,7 @@
           <a:p>
             <a:fld id="{87D3D784-D427-2D4E-91ED-57ED6EC2F9E2}" type="datetimeFigureOut">
               <a:rPr kumimoji="1" lang="ja-JP" altLang="en-US" smtClean="0"/>
-              <a:t>2025/5/16</a:t>
+              <a:t>2025/5/21</a:t>
             </a:fld>
             <a:endParaRPr kumimoji="1" lang="ja-JP" altLang="en-US"/>
           </a:p>
@@ -1723,7 +1729,7 @@
           <a:p>
             <a:fld id="{87D3D784-D427-2D4E-91ED-57ED6EC2F9E2}" type="datetimeFigureOut">
               <a:rPr kumimoji="1" lang="ja-JP" altLang="en-US" smtClean="0"/>
-              <a:t>2025/5/16</a:t>
+              <a:t>2025/5/21</a:t>
             </a:fld>
             <a:endParaRPr kumimoji="1" lang="ja-JP" altLang="en-US"/>
           </a:p>
@@ -2199,7 +2205,7 @@
           <a:p>
             <a:fld id="{87D3D784-D427-2D4E-91ED-57ED6EC2F9E2}" type="datetimeFigureOut">
               <a:rPr kumimoji="1" lang="ja-JP" altLang="en-US" smtClean="0"/>
-              <a:t>2025/5/16</a:t>
+              <a:t>2025/5/21</a:t>
             </a:fld>
             <a:endParaRPr kumimoji="1" lang="ja-JP" altLang="en-US"/>
           </a:p>
@@ -2340,7 +2346,7 @@
           <a:p>
             <a:fld id="{87D3D784-D427-2D4E-91ED-57ED6EC2F9E2}" type="datetimeFigureOut">
               <a:rPr kumimoji="1" lang="ja-JP" altLang="en-US" smtClean="0"/>
-              <a:t>2025/5/16</a:t>
+              <a:t>2025/5/21</a:t>
             </a:fld>
             <a:endParaRPr kumimoji="1" lang="ja-JP" altLang="en-US"/>
           </a:p>
@@ -2453,7 +2459,7 @@
           <a:p>
             <a:fld id="{87D3D784-D427-2D4E-91ED-57ED6EC2F9E2}" type="datetimeFigureOut">
               <a:rPr kumimoji="1" lang="ja-JP" altLang="en-US" smtClean="0"/>
-              <a:t>2025/5/16</a:t>
+              <a:t>2025/5/21</a:t>
             </a:fld>
             <a:endParaRPr kumimoji="1" lang="ja-JP" altLang="en-US"/>
           </a:p>
@@ -2796,7 +2802,7 @@
           <a:p>
             <a:fld id="{87D3D784-D427-2D4E-91ED-57ED6EC2F9E2}" type="datetimeFigureOut">
               <a:rPr kumimoji="1" lang="ja-JP" altLang="en-US" smtClean="0"/>
-              <a:t>2025/5/16</a:t>
+              <a:t>2025/5/21</a:t>
             </a:fld>
             <a:endParaRPr kumimoji="1" lang="ja-JP" altLang="en-US"/>
           </a:p>
@@ -3084,7 +3090,7 @@
           <a:p>
             <a:fld id="{87D3D784-D427-2D4E-91ED-57ED6EC2F9E2}" type="datetimeFigureOut">
               <a:rPr kumimoji="1" lang="ja-JP" altLang="en-US" smtClean="0"/>
-              <a:t>2025/5/16</a:t>
+              <a:t>2025/5/21</a:t>
             </a:fld>
             <a:endParaRPr kumimoji="1" lang="ja-JP" altLang="en-US"/>
           </a:p>
@@ -3357,7 +3363,7 @@
           <a:p>
             <a:fld id="{87D3D784-D427-2D4E-91ED-57ED6EC2F9E2}" type="datetimeFigureOut">
               <a:rPr kumimoji="1" lang="ja-JP" altLang="en-US" smtClean="0"/>
-              <a:t>2025/5/16</a:t>
+              <a:t>2025/5/21</a:t>
             </a:fld>
             <a:endParaRPr kumimoji="1" lang="ja-JP" altLang="en-US"/>
           </a:p>
@@ -3758,7 +3764,7 @@
 </file>
 
 <file path=ppt/slides/slide1.xml><?xml version="1.0" encoding="utf-8"?>
-<p:sld xmlns:a="http://schemas.openxmlformats.org/drawingml/2006/main" xmlns:r="http://schemas.openxmlformats.org/officeDocument/2006/relationships" xmlns:p="http://schemas.openxmlformats.org/presentationml/2006/main">
+<p:sld xmlns:a="http://schemas.openxmlformats.org/drawingml/2006/main" xmlns:r="http://schemas.openxmlformats.org/officeDocument/2006/relationships" xmlns:p="http://schemas.openxmlformats.org/presentationml/2006/main" show="0">
   <p:cSld>
     <p:spTree>
       <p:nvGrpSpPr>
@@ -3870,8 +3876,8 @@
           </a:prstGeom>
         </p:spPr>
       </p:pic>
-      <mc:AlternateContent xmlns:mc="http://schemas.openxmlformats.org/markup-compatibility/2006">
-        <mc:Choice xmlns:p14="http://schemas.microsoft.com/office/powerpoint/2010/main" Requires="p14">
+      <mc:AlternateContent xmlns:mc="http://schemas.openxmlformats.org/markup-compatibility/2006" xmlns:p14="http://schemas.microsoft.com/office/powerpoint/2010/main">
+        <mc:Choice Requires="p14">
           <p:contentPart p14:bwMode="auto" r:id="rId4">
             <p14:nvContentPartPr>
               <p14:cNvPr id="12" name="インク 11">
@@ -3890,7 +3896,7 @@
             </p14:xfrm>
           </p:contentPart>
         </mc:Choice>
-        <mc:Fallback>
+        <mc:Fallback xmlns="">
           <p:pic>
             <p:nvPicPr>
               <p:cNvPr id="12" name="インク 11">
@@ -3921,8 +3927,8 @@
           </p:pic>
         </mc:Fallback>
       </mc:AlternateContent>
-      <mc:AlternateContent xmlns:mc="http://schemas.openxmlformats.org/markup-compatibility/2006">
-        <mc:Choice xmlns:p14="http://schemas.microsoft.com/office/powerpoint/2010/main" Requires="p14">
+      <mc:AlternateContent xmlns:mc="http://schemas.openxmlformats.org/markup-compatibility/2006" xmlns:p14="http://schemas.microsoft.com/office/powerpoint/2010/main">
+        <mc:Choice Requires="p14">
           <p:contentPart p14:bwMode="auto" r:id="rId6">
             <p14:nvContentPartPr>
               <p14:cNvPr id="14" name="インク 13">
@@ -3941,7 +3947,7 @@
             </p14:xfrm>
           </p:contentPart>
         </mc:Choice>
-        <mc:Fallback>
+        <mc:Fallback xmlns="">
           <p:pic>
             <p:nvPicPr>
               <p:cNvPr id="14" name="インク 13">
@@ -4322,8 +4328,8 @@
           </a:prstGeom>
         </p:spPr>
       </p:pic>
-      <mc:AlternateContent xmlns:mc="http://schemas.openxmlformats.org/markup-compatibility/2006">
-        <mc:Choice xmlns:p14="http://schemas.microsoft.com/office/powerpoint/2010/main" Requires="p14">
+      <mc:AlternateContent xmlns:mc="http://schemas.openxmlformats.org/markup-compatibility/2006" xmlns:p14="http://schemas.microsoft.com/office/powerpoint/2010/main">
+        <mc:Choice Requires="p14">
           <p:contentPart p14:bwMode="auto" r:id="rId13">
             <p14:nvContentPartPr>
               <p14:cNvPr id="42" name="インク 41">
@@ -4342,7 +4348,7 @@
             </p14:xfrm>
           </p:contentPart>
         </mc:Choice>
-        <mc:Fallback>
+        <mc:Fallback xmlns="">
           <p:pic>
             <p:nvPicPr>
               <p:cNvPr id="42" name="インク 41">
@@ -4373,8 +4379,8 @@
           </p:pic>
         </mc:Fallback>
       </mc:AlternateContent>
-      <mc:AlternateContent xmlns:mc="http://schemas.openxmlformats.org/markup-compatibility/2006">
-        <mc:Choice xmlns:p14="http://schemas.microsoft.com/office/powerpoint/2010/main" Requires="p14">
+      <mc:AlternateContent xmlns:mc="http://schemas.openxmlformats.org/markup-compatibility/2006" xmlns:p14="http://schemas.microsoft.com/office/powerpoint/2010/main">
+        <mc:Choice Requires="p14">
           <p:contentPart p14:bwMode="auto" r:id="rId15">
             <p14:nvContentPartPr>
               <p14:cNvPr id="45" name="インク 44">
@@ -4393,7 +4399,7 @@
             </p14:xfrm>
           </p:contentPart>
         </mc:Choice>
-        <mc:Fallback>
+        <mc:Fallback xmlns="">
           <p:pic>
             <p:nvPicPr>
               <p:cNvPr id="45" name="インク 44">
@@ -4571,8 +4577,8 @@
           </a:p>
         </p:txBody>
       </p:sp>
-      <mc:AlternateContent xmlns:mc="http://schemas.openxmlformats.org/markup-compatibility/2006">
-        <mc:Choice xmlns:p14="http://schemas.microsoft.com/office/powerpoint/2010/main" Requires="p14">
+      <mc:AlternateContent xmlns:mc="http://schemas.openxmlformats.org/markup-compatibility/2006" xmlns:p14="http://schemas.microsoft.com/office/powerpoint/2010/main">
+        <mc:Choice Requires="p14">
           <p:contentPart p14:bwMode="auto" r:id="rId19">
             <p14:nvContentPartPr>
               <p14:cNvPr id="53" name="インク 52">
@@ -4591,7 +4597,7 @@
             </p14:xfrm>
           </p:contentPart>
         </mc:Choice>
-        <mc:Fallback>
+        <mc:Fallback xmlns="">
           <p:pic>
             <p:nvPicPr>
               <p:cNvPr id="53" name="インク 52">
@@ -4622,8 +4628,8 @@
           </p:pic>
         </mc:Fallback>
       </mc:AlternateContent>
-      <mc:AlternateContent xmlns:mc="http://schemas.openxmlformats.org/markup-compatibility/2006">
-        <mc:Choice xmlns:p14="http://schemas.microsoft.com/office/powerpoint/2010/main" Requires="p14">
+      <mc:AlternateContent xmlns:mc="http://schemas.openxmlformats.org/markup-compatibility/2006" xmlns:p14="http://schemas.microsoft.com/office/powerpoint/2010/main">
+        <mc:Choice Requires="p14">
           <p:contentPart p14:bwMode="auto" r:id="rId21">
             <p14:nvContentPartPr>
               <p14:cNvPr id="57" name="インク 56">
@@ -4642,7 +4648,7 @@
             </p14:xfrm>
           </p:contentPart>
         </mc:Choice>
-        <mc:Fallback>
+        <mc:Fallback xmlns="">
           <p:pic>
             <p:nvPicPr>
               <p:cNvPr id="57" name="インク 56">
@@ -4893,6 +4899,711 @@
     <p:extLst>
       <p:ext uri="{BB962C8B-B14F-4D97-AF65-F5344CB8AC3E}">
         <p14:creationId xmlns:p14="http://schemas.microsoft.com/office/powerpoint/2010/main" val="2763523723"/>
+      </p:ext>
+    </p:extLst>
+  </p:cSld>
+  <p:clrMapOvr>
+    <a:masterClrMapping/>
+  </p:clrMapOvr>
+</p:sld>
+</file>
+
+<file path=ppt/slides/slide2.xml><?xml version="1.0" encoding="utf-8"?>
+<p:sld xmlns:a="http://schemas.openxmlformats.org/drawingml/2006/main" xmlns:r="http://schemas.openxmlformats.org/officeDocument/2006/relationships" xmlns:p="http://schemas.openxmlformats.org/presentationml/2006/main">
+  <p:cSld>
+    <p:spTree>
+      <p:nvGrpSpPr>
+        <p:cNvPr id="1" name=""/>
+        <p:cNvGrpSpPr/>
+        <p:nvPr/>
+      </p:nvGrpSpPr>
+      <p:grpSpPr>
+        <a:xfrm>
+          <a:off x="0" y="0"/>
+          <a:ext cx="0" cy="0"/>
+          <a:chOff x="0" y="0"/>
+          <a:chExt cx="0" cy="0"/>
+        </a:xfrm>
+      </p:grpSpPr>
+      <p:sp>
+        <p:nvSpPr>
+          <p:cNvPr id="5" name="テキスト ボックス 4">
+            <a:extLst>
+              <a:ext uri="{FF2B5EF4-FFF2-40B4-BE49-F238E27FC236}">
+                <a16:creationId xmlns:a16="http://schemas.microsoft.com/office/drawing/2014/main" id="{ED0AAD0F-E560-7F4F-7C52-331EF3B54103}"/>
+              </a:ext>
+            </a:extLst>
+          </p:cNvPr>
+          <p:cNvSpPr txBox="1"/>
+          <p:nvPr/>
+        </p:nvSpPr>
+        <p:spPr>
+          <a:xfrm>
+            <a:off x="2798282" y="616759"/>
+            <a:ext cx="2040206" cy="395925"/>
+          </a:xfrm>
+          <a:prstGeom prst="rect">
+            <a:avLst/>
+          </a:prstGeom>
+          <a:noFill/>
+        </p:spPr>
+        <p:txBody>
+          <a:bodyPr wrap="square" rtlCol="0">
+            <a:spAutoFit/>
+          </a:bodyPr>
+          <a:lstStyle/>
+          <a:p>
+            <a:r>
+              <a:rPr kumimoji="1" lang="en-US" altLang="ja-JP" sz="1600" dirty="0"/>
+              <a:t>Arduino(</a:t>
+            </a:r>
+            <a:r>
+              <a:rPr kumimoji="1" lang="ja-JP" altLang="en-US" sz="1600"/>
+              <a:t>送信</a:t>
+            </a:r>
+            <a:r>
+              <a:rPr kumimoji="1" lang="en-US" altLang="ja-JP" sz="1600" dirty="0"/>
+              <a:t>)</a:t>
+            </a:r>
+            <a:endParaRPr kumimoji="1" lang="ja-JP" altLang="en-US"/>
+          </a:p>
+        </p:txBody>
+      </p:sp>
+      <p:sp>
+        <p:nvSpPr>
+          <p:cNvPr id="9" name="テキスト ボックス 8">
+            <a:extLst>
+              <a:ext uri="{FF2B5EF4-FFF2-40B4-BE49-F238E27FC236}">
+                <a16:creationId xmlns:a16="http://schemas.microsoft.com/office/drawing/2014/main" id="{EB36C4CD-1004-A2FD-2D37-46D614741F77}"/>
+              </a:ext>
+            </a:extLst>
+          </p:cNvPr>
+          <p:cNvSpPr txBox="1"/>
+          <p:nvPr/>
+        </p:nvSpPr>
+        <p:spPr>
+          <a:xfrm>
+            <a:off x="1870865" y="5063433"/>
+            <a:ext cx="3009811" cy="395925"/>
+          </a:xfrm>
+          <a:prstGeom prst="rect">
+            <a:avLst/>
+          </a:prstGeom>
+          <a:noFill/>
+        </p:spPr>
+        <p:txBody>
+          <a:bodyPr wrap="square" rtlCol="0">
+            <a:spAutoFit/>
+          </a:bodyPr>
+          <a:lstStyle/>
+          <a:p>
+            <a:r>
+              <a:rPr kumimoji="1" lang="ja-JP" altLang="en-US" sz="1600"/>
+              <a:t>ダイナミックスピーカ</a:t>
+            </a:r>
+            <a:r>
+              <a:rPr lang="ja-JP" altLang="en-US" sz="1600"/>
+              <a:t>ー</a:t>
+            </a:r>
+            <a:endParaRPr kumimoji="1" lang="en-US" altLang="ja-JP" sz="1600" dirty="0"/>
+          </a:p>
+        </p:txBody>
+      </p:sp>
+      <p:pic>
+        <p:nvPicPr>
+          <p:cNvPr id="10" name="グラフィックス 9" descr="音符 単色塗りつぶし">
+            <a:extLst>
+              <a:ext uri="{FF2B5EF4-FFF2-40B4-BE49-F238E27FC236}">
+                <a16:creationId xmlns:a16="http://schemas.microsoft.com/office/drawing/2014/main" id="{7B8E8E4D-9FF1-FE62-86BE-1146DB8EC027}"/>
+              </a:ext>
+            </a:extLst>
+          </p:cNvPr>
+          <p:cNvPicPr>
+            <a:picLocks noChangeAspect="1"/>
+          </p:cNvPicPr>
+          <p:nvPr/>
+        </p:nvPicPr>
+        <p:blipFill>
+          <a:blip r:embed="rId2">
+            <a:extLst>
+              <a:ext uri="{96DAC541-7B7A-43D3-8B79-37D633B846F1}">
+                <asvg:svgBlip xmlns:asvg="http://schemas.microsoft.com/office/drawing/2016/SVG/main" r:embed="rId3"/>
+              </a:ext>
+            </a:extLst>
+          </a:blip>
+          <a:stretch>
+            <a:fillRect/>
+          </a:stretch>
+        </p:blipFill>
+        <p:spPr>
+          <a:xfrm>
+            <a:off x="4990717" y="3358806"/>
+            <a:ext cx="532891" cy="532891"/>
+          </a:xfrm>
+          <a:prstGeom prst="rect">
+            <a:avLst/>
+          </a:prstGeom>
+        </p:spPr>
+      </p:pic>
+      <p:sp>
+        <p:nvSpPr>
+          <p:cNvPr id="12" name="テキスト ボックス 11">
+            <a:extLst>
+              <a:ext uri="{FF2B5EF4-FFF2-40B4-BE49-F238E27FC236}">
+                <a16:creationId xmlns:a16="http://schemas.microsoft.com/office/drawing/2014/main" id="{08FB774D-B01E-AAB3-700D-07D5C45E0CBA}"/>
+              </a:ext>
+            </a:extLst>
+          </p:cNvPr>
+          <p:cNvSpPr txBox="1"/>
+          <p:nvPr/>
+        </p:nvSpPr>
+        <p:spPr>
+          <a:xfrm>
+            <a:off x="5626570" y="2950398"/>
+            <a:ext cx="507722" cy="399927"/>
+          </a:xfrm>
+          <a:prstGeom prst="rect">
+            <a:avLst/>
+          </a:prstGeom>
+          <a:noFill/>
+        </p:spPr>
+        <p:txBody>
+          <a:bodyPr wrap="square" rtlCol="0">
+            <a:spAutoFit/>
+          </a:bodyPr>
+          <a:lstStyle/>
+          <a:p>
+            <a:r>
+              <a:rPr kumimoji="1" lang="ja-JP" altLang="en-US"/>
+              <a:t>音</a:t>
+            </a:r>
+          </a:p>
+        </p:txBody>
+      </p:sp>
+      <p:pic>
+        <p:nvPicPr>
+          <p:cNvPr id="18" name="図 17" descr="カップ, 座る, グリーン, 食品 が含まれている画像&#10;&#10;自動的に生成された説明">
+            <a:extLst>
+              <a:ext uri="{FF2B5EF4-FFF2-40B4-BE49-F238E27FC236}">
+                <a16:creationId xmlns:a16="http://schemas.microsoft.com/office/drawing/2014/main" id="{F82A55A6-6B9A-615D-9213-D2905617CE75}"/>
+              </a:ext>
+            </a:extLst>
+          </p:cNvPr>
+          <p:cNvPicPr>
+            <a:picLocks noChangeAspect="1"/>
+          </p:cNvPicPr>
+          <p:nvPr/>
+        </p:nvPicPr>
+        <p:blipFill>
+          <a:blip r:embed="rId4"/>
+          <a:stretch>
+            <a:fillRect/>
+          </a:stretch>
+        </p:blipFill>
+        <p:spPr>
+          <a:xfrm>
+            <a:off x="6698623" y="3601852"/>
+            <a:ext cx="1812872" cy="1351413"/>
+          </a:xfrm>
+          <a:prstGeom prst="rect">
+            <a:avLst/>
+          </a:prstGeom>
+        </p:spPr>
+      </p:pic>
+      <p:pic>
+        <p:nvPicPr>
+          <p:cNvPr id="6" name="図 5" descr="暗い, 座る, テーブル, 時計 が含まれている画像&#10;&#10;自動的に生成された説明">
+            <a:extLst>
+              <a:ext uri="{FF2B5EF4-FFF2-40B4-BE49-F238E27FC236}">
+                <a16:creationId xmlns:a16="http://schemas.microsoft.com/office/drawing/2014/main" id="{933B6B31-B7B1-FC1E-9852-2BFBB5ACF636}"/>
+              </a:ext>
+            </a:extLst>
+          </p:cNvPr>
+          <p:cNvPicPr>
+            <a:picLocks noChangeAspect="1"/>
+          </p:cNvPicPr>
+          <p:nvPr/>
+        </p:nvPicPr>
+        <p:blipFill>
+          <a:blip r:embed="rId5"/>
+          <a:stretch>
+            <a:fillRect/>
+          </a:stretch>
+        </p:blipFill>
+        <p:spPr>
+          <a:xfrm>
+            <a:off x="2833479" y="3569621"/>
+            <a:ext cx="2493839" cy="1870381"/>
+          </a:xfrm>
+          <a:prstGeom prst="rect">
+            <a:avLst/>
+          </a:prstGeom>
+        </p:spPr>
+      </p:pic>
+      <p:pic>
+        <p:nvPicPr>
+          <p:cNvPr id="11" name="グラフィックス 10" descr="音符 単色塗りつぶし">
+            <a:extLst>
+              <a:ext uri="{FF2B5EF4-FFF2-40B4-BE49-F238E27FC236}">
+                <a16:creationId xmlns:a16="http://schemas.microsoft.com/office/drawing/2014/main" id="{E80D7CF8-7A54-CD17-DBD4-A5085875B47A}"/>
+              </a:ext>
+            </a:extLst>
+          </p:cNvPr>
+          <p:cNvPicPr>
+            <a:picLocks noChangeAspect="1"/>
+          </p:cNvPicPr>
+          <p:nvPr/>
+        </p:nvPicPr>
+        <p:blipFill>
+          <a:blip r:embed="rId2">
+            <a:extLst>
+              <a:ext uri="{96DAC541-7B7A-43D3-8B79-37D633B846F1}">
+                <asvg:svgBlip xmlns:asvg="http://schemas.microsoft.com/office/drawing/2016/SVG/main" r:embed="rId3"/>
+              </a:ext>
+            </a:extLst>
+          </a:blip>
+          <a:stretch>
+            <a:fillRect/>
+          </a:stretch>
+        </p:blipFill>
+        <p:spPr>
+          <a:xfrm>
+            <a:off x="5879087" y="3385829"/>
+            <a:ext cx="532891" cy="532891"/>
+          </a:xfrm>
+          <a:prstGeom prst="rect">
+            <a:avLst/>
+          </a:prstGeom>
+        </p:spPr>
+      </p:pic>
+      <p:sp>
+        <p:nvSpPr>
+          <p:cNvPr id="19" name="テキスト ボックス 18">
+            <a:extLst>
+              <a:ext uri="{FF2B5EF4-FFF2-40B4-BE49-F238E27FC236}">
+                <a16:creationId xmlns:a16="http://schemas.microsoft.com/office/drawing/2014/main" id="{A5F1E466-ECF4-B98B-EF89-D12D0F841026}"/>
+              </a:ext>
+            </a:extLst>
+          </p:cNvPr>
+          <p:cNvSpPr txBox="1"/>
+          <p:nvPr/>
+        </p:nvSpPr>
+        <p:spPr>
+          <a:xfrm>
+            <a:off x="7746203" y="4618898"/>
+            <a:ext cx="977830" cy="366598"/>
+          </a:xfrm>
+          <a:prstGeom prst="rect">
+            <a:avLst/>
+          </a:prstGeom>
+          <a:noFill/>
+        </p:spPr>
+        <p:txBody>
+          <a:bodyPr wrap="square" rtlCol="0">
+            <a:spAutoFit/>
+          </a:bodyPr>
+          <a:lstStyle/>
+          <a:p>
+            <a:r>
+              <a:rPr kumimoji="1" lang="ja-JP" altLang="en-US" sz="1600"/>
+              <a:t>マイク</a:t>
+            </a:r>
+            <a:endParaRPr kumimoji="1" lang="ja-JP" altLang="en-US"/>
+          </a:p>
+        </p:txBody>
+      </p:sp>
+      <p:pic>
+        <p:nvPicPr>
+          <p:cNvPr id="20" name="図 19" descr="電子機器の部品&#10;&#10;中程度の精度で自動的に生成された説明">
+            <a:extLst>
+              <a:ext uri="{FF2B5EF4-FFF2-40B4-BE49-F238E27FC236}">
+                <a16:creationId xmlns:a16="http://schemas.microsoft.com/office/drawing/2014/main" id="{6289F5EB-BC83-887F-F30A-79002232E24A}"/>
+              </a:ext>
+            </a:extLst>
+          </p:cNvPr>
+          <p:cNvPicPr>
+            <a:picLocks noChangeAspect="1"/>
+          </p:cNvPicPr>
+          <p:nvPr/>
+        </p:nvPicPr>
+        <p:blipFill>
+          <a:blip r:embed="rId6"/>
+          <a:stretch>
+            <a:fillRect/>
+          </a:stretch>
+        </p:blipFill>
+        <p:spPr>
+          <a:xfrm>
+            <a:off x="6428293" y="850821"/>
+            <a:ext cx="2903789" cy="2177847"/>
+          </a:xfrm>
+          <a:prstGeom prst="rect">
+            <a:avLst/>
+          </a:prstGeom>
+        </p:spPr>
+      </p:pic>
+      <p:pic>
+        <p:nvPicPr>
+          <p:cNvPr id="4" name="図 3" descr="電子機器の部品&#10;&#10;中程度の精度で自動的に生成された説明">
+            <a:extLst>
+              <a:ext uri="{FF2B5EF4-FFF2-40B4-BE49-F238E27FC236}">
+                <a16:creationId xmlns:a16="http://schemas.microsoft.com/office/drawing/2014/main" id="{F38F8BE6-4BC4-D7B9-E411-96779B7A3254}"/>
+              </a:ext>
+            </a:extLst>
+          </p:cNvPr>
+          <p:cNvPicPr>
+            <a:picLocks noChangeAspect="1"/>
+          </p:cNvPicPr>
+          <p:nvPr/>
+        </p:nvPicPr>
+        <p:blipFill>
+          <a:blip r:embed="rId6"/>
+          <a:stretch>
+            <a:fillRect/>
+          </a:stretch>
+        </p:blipFill>
+        <p:spPr>
+          <a:xfrm>
+            <a:off x="2796836" y="966377"/>
+            <a:ext cx="2903789" cy="2177847"/>
+          </a:xfrm>
+          <a:prstGeom prst="rect">
+            <a:avLst/>
+          </a:prstGeom>
+        </p:spPr>
+      </p:pic>
+      <p:cxnSp>
+        <p:nvCxnSpPr>
+          <p:cNvPr id="33" name="直線矢印コネクタ 32">
+            <a:extLst>
+              <a:ext uri="{FF2B5EF4-FFF2-40B4-BE49-F238E27FC236}">
+                <a16:creationId xmlns:a16="http://schemas.microsoft.com/office/drawing/2014/main" id="{AD12A7FB-26E4-CC6F-C741-265841734EDF}"/>
+              </a:ext>
+            </a:extLst>
+          </p:cNvPr>
+          <p:cNvCxnSpPr>
+            <a:cxnSpLocks/>
+          </p:cNvCxnSpPr>
+          <p:nvPr/>
+        </p:nvCxnSpPr>
+        <p:spPr>
+          <a:xfrm>
+            <a:off x="4604188" y="3938076"/>
+            <a:ext cx="2552487" cy="17837"/>
+          </a:xfrm>
+          <a:prstGeom prst="straightConnector1">
+            <a:avLst/>
+          </a:prstGeom>
+          <a:ln w="19050" cap="flat" cmpd="sng" algn="ctr">
+            <a:solidFill>
+              <a:schemeClr val="accent1"/>
+            </a:solidFill>
+            <a:prstDash val="dash"/>
+            <a:round/>
+            <a:headEnd type="none" w="med" len="med"/>
+            <a:tailEnd type="arrow" w="med" len="med"/>
+          </a:ln>
+        </p:spPr>
+        <p:style>
+          <a:lnRef idx="0">
+            <a:scrgbClr r="0" g="0" b="0"/>
+          </a:lnRef>
+          <a:fillRef idx="0">
+            <a:scrgbClr r="0" g="0" b="0"/>
+          </a:fillRef>
+          <a:effectRef idx="0">
+            <a:scrgbClr r="0" g="0" b="0"/>
+          </a:effectRef>
+          <a:fontRef idx="minor">
+            <a:schemeClr val="tx1"/>
+          </a:fontRef>
+        </p:style>
+      </p:cxnSp>
+      <p:sp>
+        <p:nvSpPr>
+          <p:cNvPr id="34" name="テキスト ボックス 33">
+            <a:extLst>
+              <a:ext uri="{FF2B5EF4-FFF2-40B4-BE49-F238E27FC236}">
+                <a16:creationId xmlns:a16="http://schemas.microsoft.com/office/drawing/2014/main" id="{B7EF7376-1CBA-503D-000D-AE4D4ADDB190}"/>
+              </a:ext>
+            </a:extLst>
+          </p:cNvPr>
+          <p:cNvSpPr txBox="1"/>
+          <p:nvPr/>
+        </p:nvSpPr>
+        <p:spPr>
+          <a:xfrm>
+            <a:off x="6641859" y="616759"/>
+            <a:ext cx="2040206" cy="395925"/>
+          </a:xfrm>
+          <a:prstGeom prst="rect">
+            <a:avLst/>
+          </a:prstGeom>
+          <a:noFill/>
+        </p:spPr>
+        <p:txBody>
+          <a:bodyPr wrap="square" rtlCol="0">
+            <a:spAutoFit/>
+          </a:bodyPr>
+          <a:lstStyle/>
+          <a:p>
+            <a:r>
+              <a:rPr kumimoji="1" lang="en-US" altLang="ja-JP" sz="1600" dirty="0"/>
+              <a:t>Arduino(</a:t>
+            </a:r>
+            <a:r>
+              <a:rPr lang="ja-JP" altLang="en-US" sz="1600"/>
+              <a:t>受信</a:t>
+            </a:r>
+            <a:r>
+              <a:rPr kumimoji="1" lang="en-US" altLang="ja-JP" sz="1600" dirty="0"/>
+              <a:t>)</a:t>
+            </a:r>
+            <a:endParaRPr kumimoji="1" lang="ja-JP" altLang="en-US"/>
+          </a:p>
+        </p:txBody>
+      </p:sp>
+      <p:pic>
+        <p:nvPicPr>
+          <p:cNvPr id="35" name="グラフィックス 34" descr="音符 単色塗りつぶし">
+            <a:extLst>
+              <a:ext uri="{FF2B5EF4-FFF2-40B4-BE49-F238E27FC236}">
+                <a16:creationId xmlns:a16="http://schemas.microsoft.com/office/drawing/2014/main" id="{DEDD79DA-DA4B-16B7-C948-B87C6C866E66}"/>
+              </a:ext>
+            </a:extLst>
+          </p:cNvPr>
+          <p:cNvPicPr>
+            <a:picLocks noChangeAspect="1"/>
+          </p:cNvPicPr>
+          <p:nvPr/>
+        </p:nvPicPr>
+        <p:blipFill>
+          <a:blip r:embed="rId2">
+            <a:extLst>
+              <a:ext uri="{96DAC541-7B7A-43D3-8B79-37D633B846F1}">
+                <asvg:svgBlip xmlns:asvg="http://schemas.microsoft.com/office/drawing/2016/SVG/main" r:embed="rId3"/>
+              </a:ext>
+            </a:extLst>
+          </a:blip>
+          <a:stretch>
+            <a:fillRect/>
+          </a:stretch>
+        </p:blipFill>
+        <p:spPr>
+          <a:xfrm>
+            <a:off x="5301450" y="4093693"/>
+            <a:ext cx="532891" cy="532891"/>
+          </a:xfrm>
+          <a:prstGeom prst="rect">
+            <a:avLst/>
+          </a:prstGeom>
+        </p:spPr>
+      </p:pic>
+      <p:pic>
+        <p:nvPicPr>
+          <p:cNvPr id="36" name="グラフィックス 35" descr="音符 単色塗りつぶし">
+            <a:extLst>
+              <a:ext uri="{FF2B5EF4-FFF2-40B4-BE49-F238E27FC236}">
+                <a16:creationId xmlns:a16="http://schemas.microsoft.com/office/drawing/2014/main" id="{48CBE89B-1FB9-49A4-9773-5D80D8377FAD}"/>
+              </a:ext>
+            </a:extLst>
+          </p:cNvPr>
+          <p:cNvPicPr>
+            <a:picLocks noChangeAspect="1"/>
+          </p:cNvPicPr>
+          <p:nvPr/>
+        </p:nvPicPr>
+        <p:blipFill>
+          <a:blip r:embed="rId2">
+            <a:extLst>
+              <a:ext uri="{96DAC541-7B7A-43D3-8B79-37D633B846F1}">
+                <asvg:svgBlip xmlns:asvg="http://schemas.microsoft.com/office/drawing/2016/SVG/main" r:embed="rId3"/>
+              </a:ext>
+            </a:extLst>
+          </a:blip>
+          <a:stretch>
+            <a:fillRect/>
+          </a:stretch>
+        </p:blipFill>
+        <p:spPr>
+          <a:xfrm>
+            <a:off x="6289932" y="4078091"/>
+            <a:ext cx="532891" cy="532891"/>
+          </a:xfrm>
+          <a:prstGeom prst="rect">
+            <a:avLst/>
+          </a:prstGeom>
+        </p:spPr>
+      </p:pic>
+      <p:sp>
+        <p:nvSpPr>
+          <p:cNvPr id="37" name="テキスト ボックス 36">
+            <a:extLst>
+              <a:ext uri="{FF2B5EF4-FFF2-40B4-BE49-F238E27FC236}">
+                <a16:creationId xmlns:a16="http://schemas.microsoft.com/office/drawing/2014/main" id="{7B33FB57-B84C-3290-0B88-F96BF6EF0F9F}"/>
+              </a:ext>
+            </a:extLst>
+          </p:cNvPr>
+          <p:cNvSpPr txBox="1"/>
+          <p:nvPr/>
+        </p:nvSpPr>
+        <p:spPr>
+          <a:xfrm>
+            <a:off x="1373343" y="3155188"/>
+            <a:ext cx="2621230" cy="369332"/>
+          </a:xfrm>
+          <a:prstGeom prst="rect">
+            <a:avLst/>
+          </a:prstGeom>
+          <a:noFill/>
+        </p:spPr>
+        <p:txBody>
+          <a:bodyPr wrap="none" rtlCol="0">
+            <a:spAutoFit/>
+          </a:bodyPr>
+          <a:lstStyle/>
+          <a:p>
+            <a:r>
+              <a:rPr kumimoji="1" lang="en-US" altLang="ja-JP" dirty="0"/>
+              <a:t>4</a:t>
+            </a:r>
+            <a:r>
+              <a:rPr kumimoji="1" lang="ja-JP" altLang="en-US"/>
+              <a:t>進数の数列を音に変換</a:t>
+            </a:r>
+          </a:p>
+        </p:txBody>
+      </p:sp>
+      <p:sp>
+        <p:nvSpPr>
+          <p:cNvPr id="38" name="テキスト ボックス 37">
+            <a:extLst>
+              <a:ext uri="{FF2B5EF4-FFF2-40B4-BE49-F238E27FC236}">
+                <a16:creationId xmlns:a16="http://schemas.microsoft.com/office/drawing/2014/main" id="{ED861CA6-7C3B-BFEA-E533-F76F3DC0DF55}"/>
+              </a:ext>
+            </a:extLst>
+          </p:cNvPr>
+          <p:cNvSpPr txBox="1"/>
+          <p:nvPr/>
+        </p:nvSpPr>
+        <p:spPr>
+          <a:xfrm>
+            <a:off x="7866287" y="3138848"/>
+            <a:ext cx="3343025" cy="369332"/>
+          </a:xfrm>
+          <a:prstGeom prst="rect">
+            <a:avLst/>
+          </a:prstGeom>
+          <a:noFill/>
+        </p:spPr>
+        <p:txBody>
+          <a:bodyPr wrap="square" rtlCol="0">
+            <a:spAutoFit/>
+          </a:bodyPr>
+          <a:lstStyle/>
+          <a:p>
+            <a:r>
+              <a:rPr lang="ja-JP" altLang="en-US"/>
+              <a:t>周波数から</a:t>
+            </a:r>
+            <a:r>
+              <a:rPr lang="en-US" altLang="ja-JP" dirty="0"/>
+              <a:t>4</a:t>
+            </a:r>
+            <a:r>
+              <a:rPr lang="ja-JP" altLang="en-US"/>
+              <a:t>進数の数列に変換</a:t>
+            </a:r>
+            <a:endParaRPr kumimoji="1" lang="ja-JP" altLang="en-US"/>
+          </a:p>
+        </p:txBody>
+      </p:sp>
+      <p:cxnSp>
+        <p:nvCxnSpPr>
+          <p:cNvPr id="40" name="直線矢印コネクタ 39">
+            <a:extLst>
+              <a:ext uri="{FF2B5EF4-FFF2-40B4-BE49-F238E27FC236}">
+                <a16:creationId xmlns:a16="http://schemas.microsoft.com/office/drawing/2014/main" id="{1966273A-3AB3-C1F7-A003-9350B9903B27}"/>
+              </a:ext>
+            </a:extLst>
+          </p:cNvPr>
+          <p:cNvCxnSpPr>
+            <a:cxnSpLocks/>
+          </p:cNvCxnSpPr>
+          <p:nvPr/>
+        </p:nvCxnSpPr>
+        <p:spPr>
+          <a:xfrm>
+            <a:off x="4098825" y="3004464"/>
+            <a:ext cx="0" cy="856222"/>
+          </a:xfrm>
+          <a:prstGeom prst="straightConnector1">
+            <a:avLst/>
+          </a:prstGeom>
+          <a:ln>
+            <a:tailEnd type="triangle"/>
+          </a:ln>
+        </p:spPr>
+        <p:style>
+          <a:lnRef idx="2">
+            <a:schemeClr val="accent1"/>
+          </a:lnRef>
+          <a:fillRef idx="0">
+            <a:schemeClr val="accent1"/>
+          </a:fillRef>
+          <a:effectRef idx="1">
+            <a:schemeClr val="accent1"/>
+          </a:effectRef>
+          <a:fontRef idx="minor">
+            <a:schemeClr val="tx1"/>
+          </a:fontRef>
+        </p:style>
+      </p:cxnSp>
+      <p:cxnSp>
+        <p:nvCxnSpPr>
+          <p:cNvPr id="44" name="直線矢印コネクタ 43">
+            <a:extLst>
+              <a:ext uri="{FF2B5EF4-FFF2-40B4-BE49-F238E27FC236}">
+                <a16:creationId xmlns:a16="http://schemas.microsoft.com/office/drawing/2014/main" id="{3E55483F-1DD8-E32F-DEBF-56B2E7B185E2}"/>
+              </a:ext>
+            </a:extLst>
+          </p:cNvPr>
+          <p:cNvCxnSpPr>
+            <a:cxnSpLocks/>
+          </p:cNvCxnSpPr>
+          <p:nvPr/>
+        </p:nvCxnSpPr>
+        <p:spPr>
+          <a:xfrm flipV="1">
+            <a:off x="7746203" y="2846554"/>
+            <a:ext cx="0" cy="857602"/>
+          </a:xfrm>
+          <a:prstGeom prst="straightConnector1">
+            <a:avLst/>
+          </a:prstGeom>
+          <a:ln>
+            <a:tailEnd type="triangle"/>
+          </a:ln>
+        </p:spPr>
+        <p:style>
+          <a:lnRef idx="2">
+            <a:schemeClr val="accent1"/>
+          </a:lnRef>
+          <a:fillRef idx="0">
+            <a:schemeClr val="accent1"/>
+          </a:fillRef>
+          <a:effectRef idx="1">
+            <a:schemeClr val="accent1"/>
+          </a:effectRef>
+          <a:fontRef idx="minor">
+            <a:schemeClr val="tx1"/>
+          </a:fontRef>
+        </p:style>
+      </p:cxnSp>
+    </p:spTree>
+    <p:extLst>
+      <p:ext uri="{BB962C8B-B14F-4D97-AF65-F5344CB8AC3E}">
+        <p14:creationId xmlns:p14="http://schemas.microsoft.com/office/powerpoint/2010/main" val="131808184"/>
       </p:ext>
     </p:extLst>
   </p:cSld>

</xml_diff>